<commit_message>
Indexing to be started from Zero
</commit_message>
<xml_diff>
--- a/doc/design.pptx
+++ b/doc/design.pptx
@@ -7,7 +7,7 @@
   <p:sldIdLst>
     <p:sldId id="256" r:id="rId2"/>
     <p:sldId id="257" r:id="rId3"/>
-    <p:sldId id="258" r:id="rId4"/>
+    <p:sldId id="260" r:id="rId4"/>
     <p:sldId id="259" r:id="rId5"/>
   </p:sldIdLst>
   <p:sldSz cx="12192000" cy="6858000"/>
@@ -107,6 +107,11 @@
       </a:defRPr>
     </a:lvl9pPr>
   </p:defaultTextStyle>
+  <p:extLst>
+    <p:ext uri="{EFAFB233-063F-42B5-8137-9DF3F51BA10A}">
+      <p15:sldGuideLst xmlns:p15="http://schemas.microsoft.com/office/powerpoint/2012/main"/>
+    </p:ext>
+  </p:extLst>
 </p:presentation>
 </file>
 
@@ -259,7 +264,7 @@
           <a:p>
             <a:fld id="{BADDB087-A138-453D-A7A1-17D0775AE1E5}" type="datetimeFigureOut">
               <a:rPr lang="en-US" smtClean="0"/>
-              <a:t>12/7/2023</a:t>
+              <a:t>12/13/2023</a:t>
             </a:fld>
             <a:endParaRPr lang="en-US"/>
           </a:p>
@@ -459,7 +464,7 @@
           <a:p>
             <a:fld id="{BADDB087-A138-453D-A7A1-17D0775AE1E5}" type="datetimeFigureOut">
               <a:rPr lang="en-US" smtClean="0"/>
-              <a:t>12/7/2023</a:t>
+              <a:t>12/13/2023</a:t>
             </a:fld>
             <a:endParaRPr lang="en-US"/>
           </a:p>
@@ -669,7 +674,7 @@
           <a:p>
             <a:fld id="{BADDB087-A138-453D-A7A1-17D0775AE1E5}" type="datetimeFigureOut">
               <a:rPr lang="en-US" smtClean="0"/>
-              <a:t>12/7/2023</a:t>
+              <a:t>12/13/2023</a:t>
             </a:fld>
             <a:endParaRPr lang="en-US"/>
           </a:p>
@@ -869,7 +874,7 @@
           <a:p>
             <a:fld id="{BADDB087-A138-453D-A7A1-17D0775AE1E5}" type="datetimeFigureOut">
               <a:rPr lang="en-US" smtClean="0"/>
-              <a:t>12/7/2023</a:t>
+              <a:t>12/13/2023</a:t>
             </a:fld>
             <a:endParaRPr lang="en-US"/>
           </a:p>
@@ -1145,7 +1150,7 @@
           <a:p>
             <a:fld id="{BADDB087-A138-453D-A7A1-17D0775AE1E5}" type="datetimeFigureOut">
               <a:rPr lang="en-US" smtClean="0"/>
-              <a:t>12/7/2023</a:t>
+              <a:t>12/13/2023</a:t>
             </a:fld>
             <a:endParaRPr lang="en-US"/>
           </a:p>
@@ -1413,7 +1418,7 @@
           <a:p>
             <a:fld id="{BADDB087-A138-453D-A7A1-17D0775AE1E5}" type="datetimeFigureOut">
               <a:rPr lang="en-US" smtClean="0"/>
-              <a:t>12/7/2023</a:t>
+              <a:t>12/13/2023</a:t>
             </a:fld>
             <a:endParaRPr lang="en-US"/>
           </a:p>
@@ -1828,7 +1833,7 @@
           <a:p>
             <a:fld id="{BADDB087-A138-453D-A7A1-17D0775AE1E5}" type="datetimeFigureOut">
               <a:rPr lang="en-US" smtClean="0"/>
-              <a:t>12/7/2023</a:t>
+              <a:t>12/13/2023</a:t>
             </a:fld>
             <a:endParaRPr lang="en-US"/>
           </a:p>
@@ -1970,7 +1975,7 @@
           <a:p>
             <a:fld id="{BADDB087-A138-453D-A7A1-17D0775AE1E5}" type="datetimeFigureOut">
               <a:rPr lang="en-US" smtClean="0"/>
-              <a:t>12/7/2023</a:t>
+              <a:t>12/13/2023</a:t>
             </a:fld>
             <a:endParaRPr lang="en-US"/>
           </a:p>
@@ -2083,7 +2088,7 @@
           <a:p>
             <a:fld id="{BADDB087-A138-453D-A7A1-17D0775AE1E5}" type="datetimeFigureOut">
               <a:rPr lang="en-US" smtClean="0"/>
-              <a:t>12/7/2023</a:t>
+              <a:t>12/13/2023</a:t>
             </a:fld>
             <a:endParaRPr lang="en-US"/>
           </a:p>
@@ -2396,7 +2401,7 @@
           <a:p>
             <a:fld id="{BADDB087-A138-453D-A7A1-17D0775AE1E5}" type="datetimeFigureOut">
               <a:rPr lang="en-US" smtClean="0"/>
-              <a:t>12/7/2023</a:t>
+              <a:t>12/13/2023</a:t>
             </a:fld>
             <a:endParaRPr lang="en-US"/>
           </a:p>
@@ -2685,7 +2690,7 @@
           <a:p>
             <a:fld id="{BADDB087-A138-453D-A7A1-17D0775AE1E5}" type="datetimeFigureOut">
               <a:rPr lang="en-US" smtClean="0"/>
-              <a:t>12/7/2023</a:t>
+              <a:t>12/13/2023</a:t>
             </a:fld>
             <a:endParaRPr lang="en-US"/>
           </a:p>
@@ -2928,7 +2933,7 @@
           <a:p>
             <a:fld id="{BADDB087-A138-453D-A7A1-17D0775AE1E5}" type="datetimeFigureOut">
               <a:rPr lang="en-US" smtClean="0"/>
-              <a:t>12/7/2023</a:t>
+              <a:t>12/13/2023</a:t>
             </a:fld>
             <a:endParaRPr lang="en-US"/>
           </a:p>
@@ -5719,7 +5724,7 @@
         </p:nvSpPr>
         <p:spPr>
           <a:xfrm>
-            <a:off x="1517639" y="1286256"/>
+            <a:off x="512917" y="2196928"/>
             <a:ext cx="301686" cy="369332"/>
           </a:xfrm>
           <a:prstGeom prst="rect">
@@ -5754,7 +5759,7 @@
         </p:nvSpPr>
         <p:spPr>
           <a:xfrm>
-            <a:off x="426623" y="2094028"/>
+            <a:off x="2299176" y="2178095"/>
             <a:ext cx="301686" cy="369332"/>
           </a:xfrm>
           <a:prstGeom prst="rect">
@@ -5789,7 +5794,42 @@
         </p:nvSpPr>
         <p:spPr>
           <a:xfrm>
-            <a:off x="2249273" y="2189654"/>
+            <a:off x="1475199" y="2526458"/>
+            <a:ext cx="241166" cy="369332"/>
+          </a:xfrm>
+          <a:prstGeom prst="rect">
+            <a:avLst/>
+          </a:prstGeom>
+          <a:noFill/>
+        </p:spPr>
+        <p:txBody>
+          <a:bodyPr wrap="square" rtlCol="0">
+            <a:spAutoFit/>
+          </a:bodyPr>
+          <a:lstStyle/>
+          <a:p>
+            <a:r>
+              <a:rPr lang="en-US" dirty="0"/>
+              <a:t>3</a:t>
+            </a:r>
+          </a:p>
+        </p:txBody>
+      </p:sp>
+      <p:sp>
+        <p:nvSpPr>
+          <p:cNvPr id="36" name="Tekstiruutu 35">
+            <a:extLst>
+              <a:ext uri="{FF2B5EF4-FFF2-40B4-BE49-F238E27FC236}">
+                <a16:creationId xmlns:a16="http://schemas.microsoft.com/office/drawing/2014/main" id="{AA75F0C7-DBE8-783B-AD92-F6A586DE9C5D}"/>
+              </a:ext>
+            </a:extLst>
+          </p:cNvPr>
+          <p:cNvSpPr txBox="1"/>
+          <p:nvPr/>
+        </p:nvSpPr>
+        <p:spPr>
+          <a:xfrm>
+            <a:off x="455818" y="3389702"/>
             <a:ext cx="301686" cy="369332"/>
           </a:xfrm>
           <a:prstGeom prst="rect">
@@ -5805,17 +5845,17 @@
           <a:p>
             <a:r>
               <a:rPr lang="en-US" dirty="0"/>
-              <a:t>3</a:t>
-            </a:r>
-          </a:p>
-        </p:txBody>
-      </p:sp>
-      <p:sp>
-        <p:nvSpPr>
-          <p:cNvPr id="36" name="Tekstiruutu 35">
-            <a:extLst>
-              <a:ext uri="{FF2B5EF4-FFF2-40B4-BE49-F238E27FC236}">
-                <a16:creationId xmlns:a16="http://schemas.microsoft.com/office/drawing/2014/main" id="{AA75F0C7-DBE8-783B-AD92-F6A586DE9C5D}"/>
+              <a:t>4</a:t>
+            </a:r>
+          </a:p>
+        </p:txBody>
+      </p:sp>
+      <p:sp>
+        <p:nvSpPr>
+          <p:cNvPr id="37" name="Tekstiruutu 36">
+            <a:extLst>
+              <a:ext uri="{FF2B5EF4-FFF2-40B4-BE49-F238E27FC236}">
+                <a16:creationId xmlns:a16="http://schemas.microsoft.com/office/drawing/2014/main" id="{85D45D38-01A9-A4D6-EBDE-8D1FCF1109C3}"/>
               </a:ext>
             </a:extLst>
           </p:cNvPr>
@@ -5824,7 +5864,7 @@
         </p:nvSpPr>
         <p:spPr>
           <a:xfrm>
-            <a:off x="1452659" y="2492390"/>
+            <a:off x="2281825" y="3427738"/>
             <a:ext cx="301686" cy="369332"/>
           </a:xfrm>
           <a:prstGeom prst="rect">
@@ -5840,17 +5880,17 @@
           <a:p>
             <a:r>
               <a:rPr lang="en-US" dirty="0"/>
-              <a:t>4</a:t>
-            </a:r>
-          </a:p>
-        </p:txBody>
-      </p:sp>
-      <p:sp>
-        <p:nvSpPr>
-          <p:cNvPr id="37" name="Tekstiruutu 36">
-            <a:extLst>
-              <a:ext uri="{FF2B5EF4-FFF2-40B4-BE49-F238E27FC236}">
-                <a16:creationId xmlns:a16="http://schemas.microsoft.com/office/drawing/2014/main" id="{85D45D38-01A9-A4D6-EBDE-8D1FCF1109C3}"/>
+              <a:t>5</a:t>
+            </a:r>
+          </a:p>
+        </p:txBody>
+      </p:sp>
+      <p:sp>
+        <p:nvSpPr>
+          <p:cNvPr id="38" name="Tekstiruutu 37">
+            <a:extLst>
+              <a:ext uri="{FF2B5EF4-FFF2-40B4-BE49-F238E27FC236}">
+                <a16:creationId xmlns:a16="http://schemas.microsoft.com/office/drawing/2014/main" id="{0CDC5AC3-78F9-DF01-7967-6B0C44FA7F37}"/>
               </a:ext>
             </a:extLst>
           </p:cNvPr>
@@ -5859,7 +5899,7 @@
         </p:nvSpPr>
         <p:spPr>
           <a:xfrm>
-            <a:off x="402185" y="3329678"/>
+            <a:off x="3567936" y="1320987"/>
             <a:ext cx="301686" cy="369332"/>
           </a:xfrm>
           <a:prstGeom prst="rect">
@@ -5875,17 +5915,17 @@
           <a:p>
             <a:r>
               <a:rPr lang="en-US" dirty="0"/>
-              <a:t>5</a:t>
-            </a:r>
-          </a:p>
-        </p:txBody>
-      </p:sp>
-      <p:sp>
-        <p:nvSpPr>
-          <p:cNvPr id="38" name="Tekstiruutu 37">
-            <a:extLst>
-              <a:ext uri="{FF2B5EF4-FFF2-40B4-BE49-F238E27FC236}">
-                <a16:creationId xmlns:a16="http://schemas.microsoft.com/office/drawing/2014/main" id="{0CDC5AC3-78F9-DF01-7967-6B0C44FA7F37}"/>
+              <a:t>7</a:t>
+            </a:r>
+          </a:p>
+        </p:txBody>
+      </p:sp>
+      <p:sp>
+        <p:nvSpPr>
+          <p:cNvPr id="39" name="Tekstiruutu 38">
+            <a:extLst>
+              <a:ext uri="{FF2B5EF4-FFF2-40B4-BE49-F238E27FC236}">
+                <a16:creationId xmlns:a16="http://schemas.microsoft.com/office/drawing/2014/main" id="{B11EAFE4-E46E-574D-41B6-39B90D23178E}"/>
               </a:ext>
             </a:extLst>
           </p:cNvPr>
@@ -5894,42 +5934,7 @@
         </p:nvSpPr>
         <p:spPr>
           <a:xfrm>
-            <a:off x="1439992" y="4443409"/>
-            <a:ext cx="301686" cy="369332"/>
-          </a:xfrm>
-          <a:prstGeom prst="rect">
-            <a:avLst/>
-          </a:prstGeom>
-          <a:noFill/>
-        </p:spPr>
-        <p:txBody>
-          <a:bodyPr wrap="none" rtlCol="0">
-            <a:spAutoFit/>
-          </a:bodyPr>
-          <a:lstStyle/>
-          <a:p>
-            <a:r>
-              <a:rPr lang="en-US" dirty="0"/>
-              <a:t>7</a:t>
-            </a:r>
-          </a:p>
-        </p:txBody>
-      </p:sp>
-      <p:sp>
-        <p:nvSpPr>
-          <p:cNvPr id="39" name="Tekstiruutu 38">
-            <a:extLst>
-              <a:ext uri="{FF2B5EF4-FFF2-40B4-BE49-F238E27FC236}">
-                <a16:creationId xmlns:a16="http://schemas.microsoft.com/office/drawing/2014/main" id="{B11EAFE4-E46E-574D-41B6-39B90D23178E}"/>
-              </a:ext>
-            </a:extLst>
-          </p:cNvPr>
-          <p:cNvSpPr txBox="1"/>
-          <p:nvPr/>
-        </p:nvSpPr>
-        <p:spPr>
-          <a:xfrm>
-            <a:off x="2269517" y="3329678"/>
+            <a:off x="1479770" y="4307313"/>
             <a:ext cx="301686" cy="369332"/>
           </a:xfrm>
           <a:prstGeom prst="rect">
@@ -6286,7 +6291,42 @@
         </p:nvSpPr>
         <p:spPr>
           <a:xfrm>
-            <a:off x="3666413" y="1358256"/>
+            <a:off x="2697517" y="2242270"/>
+            <a:ext cx="301686" cy="369332"/>
+          </a:xfrm>
+          <a:prstGeom prst="rect">
+            <a:avLst/>
+          </a:prstGeom>
+          <a:noFill/>
+        </p:spPr>
+        <p:txBody>
+          <a:bodyPr wrap="square" rtlCol="0">
+            <a:spAutoFit/>
+          </a:bodyPr>
+          <a:lstStyle/>
+          <a:p>
+            <a:r>
+              <a:rPr lang="en-US" dirty="0"/>
+              <a:t>8</a:t>
+            </a:r>
+          </a:p>
+        </p:txBody>
+      </p:sp>
+      <p:sp>
+        <p:nvSpPr>
+          <p:cNvPr id="48" name="Tekstiruutu 47">
+            <a:extLst>
+              <a:ext uri="{FF2B5EF4-FFF2-40B4-BE49-F238E27FC236}">
+                <a16:creationId xmlns:a16="http://schemas.microsoft.com/office/drawing/2014/main" id="{060C98A5-7E9A-6D9B-0DD3-6B2508D45A79}"/>
+              </a:ext>
+            </a:extLst>
+          </p:cNvPr>
+          <p:cNvSpPr txBox="1"/>
+          <p:nvPr/>
+        </p:nvSpPr>
+        <p:spPr>
+          <a:xfrm>
+            <a:off x="4424441" y="2242693"/>
             <a:ext cx="301686" cy="369332"/>
           </a:xfrm>
           <a:prstGeom prst="rect">
@@ -6302,17 +6342,17 @@
           <a:p>
             <a:r>
               <a:rPr lang="en-US" dirty="0"/>
-              <a:t>8</a:t>
-            </a:r>
-          </a:p>
-        </p:txBody>
-      </p:sp>
-      <p:sp>
-        <p:nvSpPr>
-          <p:cNvPr id="48" name="Tekstiruutu 47">
-            <a:extLst>
-              <a:ext uri="{FF2B5EF4-FFF2-40B4-BE49-F238E27FC236}">
-                <a16:creationId xmlns:a16="http://schemas.microsoft.com/office/drawing/2014/main" id="{060C98A5-7E9A-6D9B-0DD3-6B2508D45A79}"/>
+              <a:t>9</a:t>
+            </a:r>
+          </a:p>
+        </p:txBody>
+      </p:sp>
+      <p:sp>
+        <p:nvSpPr>
+          <p:cNvPr id="49" name="Tekstiruutu 48">
+            <a:extLst>
+              <a:ext uri="{FF2B5EF4-FFF2-40B4-BE49-F238E27FC236}">
+                <a16:creationId xmlns:a16="http://schemas.microsoft.com/office/drawing/2014/main" id="{174CFA3B-9E28-4E31-6EB1-6D9C5685C73E}"/>
               </a:ext>
             </a:extLst>
           </p:cNvPr>
@@ -6321,8 +6361,8 @@
         </p:nvSpPr>
         <p:spPr>
           <a:xfrm>
-            <a:off x="2575397" y="2166028"/>
-            <a:ext cx="301686" cy="369332"/>
+            <a:off x="3450918" y="2573057"/>
+            <a:ext cx="418704" cy="369332"/>
           </a:xfrm>
           <a:prstGeom prst="rect">
             <a:avLst/>
@@ -6337,17 +6377,17 @@
           <a:p>
             <a:r>
               <a:rPr lang="en-US" dirty="0"/>
-              <a:t>9</a:t>
-            </a:r>
-          </a:p>
-        </p:txBody>
-      </p:sp>
-      <p:sp>
-        <p:nvSpPr>
-          <p:cNvPr id="49" name="Tekstiruutu 48">
-            <a:extLst>
-              <a:ext uri="{FF2B5EF4-FFF2-40B4-BE49-F238E27FC236}">
-                <a16:creationId xmlns:a16="http://schemas.microsoft.com/office/drawing/2014/main" id="{174CFA3B-9E28-4E31-6EB1-6D9C5685C73E}"/>
+              <a:t>10</a:t>
+            </a:r>
+          </a:p>
+        </p:txBody>
+      </p:sp>
+      <p:sp>
+        <p:nvSpPr>
+          <p:cNvPr id="50" name="Tekstiruutu 49">
+            <a:extLst>
+              <a:ext uri="{FF2B5EF4-FFF2-40B4-BE49-F238E27FC236}">
+                <a16:creationId xmlns:a16="http://schemas.microsoft.com/office/drawing/2014/main" id="{977C13A2-F48F-7BC7-6002-AE43E922A1E5}"/>
               </a:ext>
             </a:extLst>
           </p:cNvPr>
@@ -6356,7 +6396,7 @@
         </p:nvSpPr>
         <p:spPr>
           <a:xfrm>
-            <a:off x="4398047" y="2261654"/>
+            <a:off x="2627232" y="3514344"/>
             <a:ext cx="418704" cy="369332"/>
           </a:xfrm>
           <a:prstGeom prst="rect">
@@ -6372,17 +6412,17 @@
           <a:p>
             <a:r>
               <a:rPr lang="en-US" dirty="0"/>
-              <a:t>10</a:t>
-            </a:r>
-          </a:p>
-        </p:txBody>
-      </p:sp>
-      <p:sp>
-        <p:nvSpPr>
-          <p:cNvPr id="50" name="Tekstiruutu 49">
-            <a:extLst>
-              <a:ext uri="{FF2B5EF4-FFF2-40B4-BE49-F238E27FC236}">
-                <a16:creationId xmlns:a16="http://schemas.microsoft.com/office/drawing/2014/main" id="{977C13A2-F48F-7BC7-6002-AE43E922A1E5}"/>
+              <a:t>11</a:t>
+            </a:r>
+          </a:p>
+        </p:txBody>
+      </p:sp>
+      <p:sp>
+        <p:nvSpPr>
+          <p:cNvPr id="51" name="Tekstiruutu 50">
+            <a:extLst>
+              <a:ext uri="{FF2B5EF4-FFF2-40B4-BE49-F238E27FC236}">
+                <a16:creationId xmlns:a16="http://schemas.microsoft.com/office/drawing/2014/main" id="{A1B6412A-545A-72E8-BEC1-A85D38DF59C5}"/>
               </a:ext>
             </a:extLst>
           </p:cNvPr>
@@ -6391,7 +6431,7 @@
         </p:nvSpPr>
         <p:spPr>
           <a:xfrm>
-            <a:off x="3601433" y="2564390"/>
+            <a:off x="4396584" y="3503689"/>
             <a:ext cx="418704" cy="369332"/>
           </a:xfrm>
           <a:prstGeom prst="rect">
@@ -6407,17 +6447,17 @@
           <a:p>
             <a:r>
               <a:rPr lang="en-US" dirty="0"/>
-              <a:t>11</a:t>
-            </a:r>
-          </a:p>
-        </p:txBody>
-      </p:sp>
-      <p:sp>
-        <p:nvSpPr>
-          <p:cNvPr id="51" name="Tekstiruutu 50">
-            <a:extLst>
-              <a:ext uri="{FF2B5EF4-FFF2-40B4-BE49-F238E27FC236}">
-                <a16:creationId xmlns:a16="http://schemas.microsoft.com/office/drawing/2014/main" id="{A1B6412A-545A-72E8-BEC1-A85D38DF59C5}"/>
+              <a:t>12</a:t>
+            </a:r>
+          </a:p>
+        </p:txBody>
+      </p:sp>
+      <p:sp>
+        <p:nvSpPr>
+          <p:cNvPr id="52" name="Tekstiruutu 51">
+            <a:extLst>
+              <a:ext uri="{FF2B5EF4-FFF2-40B4-BE49-F238E27FC236}">
+                <a16:creationId xmlns:a16="http://schemas.microsoft.com/office/drawing/2014/main" id="{E7282F5D-3A31-093D-9AB0-8C645BD190ED}"/>
               </a:ext>
             </a:extLst>
           </p:cNvPr>
@@ -6426,7 +6466,7 @@
         </p:nvSpPr>
         <p:spPr>
           <a:xfrm>
-            <a:off x="2550959" y="3401678"/>
+            <a:off x="7104714" y="1173590"/>
             <a:ext cx="418704" cy="369332"/>
           </a:xfrm>
           <a:prstGeom prst="rect">
@@ -6442,17 +6482,17 @@
           <a:p>
             <a:r>
               <a:rPr lang="en-US" dirty="0"/>
-              <a:t>12</a:t>
-            </a:r>
-          </a:p>
-        </p:txBody>
-      </p:sp>
-      <p:sp>
-        <p:nvSpPr>
-          <p:cNvPr id="52" name="Tekstiruutu 51">
-            <a:extLst>
-              <a:ext uri="{FF2B5EF4-FFF2-40B4-BE49-F238E27FC236}">
-                <a16:creationId xmlns:a16="http://schemas.microsoft.com/office/drawing/2014/main" id="{E7282F5D-3A31-093D-9AB0-8C645BD190ED}"/>
+              <a:t>14</a:t>
+            </a:r>
+          </a:p>
+        </p:txBody>
+      </p:sp>
+      <p:sp>
+        <p:nvSpPr>
+          <p:cNvPr id="53" name="Tekstiruutu 52">
+            <a:extLst>
+              <a:ext uri="{FF2B5EF4-FFF2-40B4-BE49-F238E27FC236}">
+                <a16:creationId xmlns:a16="http://schemas.microsoft.com/office/drawing/2014/main" id="{03F3DA38-533E-7181-7AD0-00C707EC6496}"/>
               </a:ext>
             </a:extLst>
           </p:cNvPr>
@@ -6461,42 +6501,7 @@
         </p:nvSpPr>
         <p:spPr>
           <a:xfrm>
-            <a:off x="3558597" y="4522080"/>
-            <a:ext cx="418704" cy="369332"/>
-          </a:xfrm>
-          <a:prstGeom prst="rect">
-            <a:avLst/>
-          </a:prstGeom>
-          <a:noFill/>
-        </p:spPr>
-        <p:txBody>
-          <a:bodyPr wrap="none" rtlCol="0">
-            <a:spAutoFit/>
-          </a:bodyPr>
-          <a:lstStyle/>
-          <a:p>
-            <a:r>
-              <a:rPr lang="en-US" dirty="0"/>
-              <a:t>14</a:t>
-            </a:r>
-          </a:p>
-        </p:txBody>
-      </p:sp>
-      <p:sp>
-        <p:nvSpPr>
-          <p:cNvPr id="53" name="Tekstiruutu 52">
-            <a:extLst>
-              <a:ext uri="{FF2B5EF4-FFF2-40B4-BE49-F238E27FC236}">
-                <a16:creationId xmlns:a16="http://schemas.microsoft.com/office/drawing/2014/main" id="{03F3DA38-533E-7181-7AD0-00C707EC6496}"/>
-              </a:ext>
-            </a:extLst>
-          </p:cNvPr>
-          <p:cNvSpPr txBox="1"/>
-          <p:nvPr/>
-        </p:nvSpPr>
-        <p:spPr>
-          <a:xfrm>
-            <a:off x="4418291" y="3401678"/>
+            <a:off x="3516869" y="4383788"/>
             <a:ext cx="418704" cy="369332"/>
           </a:xfrm>
           <a:prstGeom prst="rect">
@@ -6853,7 +6858,7 @@
         </p:nvSpPr>
         <p:spPr>
           <a:xfrm>
-            <a:off x="7325973" y="1250255"/>
+            <a:off x="6147030" y="2073472"/>
             <a:ext cx="418704" cy="369332"/>
           </a:xfrm>
           <a:prstGeom prst="rect">
@@ -6888,7 +6893,7 @@
         </p:nvSpPr>
         <p:spPr>
           <a:xfrm>
-            <a:off x="6234957" y="2058027"/>
+            <a:off x="8073309" y="2128613"/>
             <a:ext cx="418704" cy="369332"/>
           </a:xfrm>
           <a:prstGeom prst="rect">
@@ -6923,7 +6928,7 @@
         </p:nvSpPr>
         <p:spPr>
           <a:xfrm>
-            <a:off x="7260993" y="2456389"/>
+            <a:off x="6117365" y="3320213"/>
             <a:ext cx="418704" cy="369332"/>
           </a:xfrm>
           <a:prstGeom prst="rect">
@@ -6958,7 +6963,7 @@
         </p:nvSpPr>
         <p:spPr>
           <a:xfrm>
-            <a:off x="6140406" y="3231041"/>
+            <a:off x="8176422" y="3319023"/>
             <a:ext cx="418704" cy="369332"/>
           </a:xfrm>
           <a:prstGeom prst="rect">
@@ -6993,7 +6998,7 @@
         </p:nvSpPr>
         <p:spPr>
           <a:xfrm>
-            <a:off x="7234938" y="4395791"/>
+            <a:off x="9685530" y="1173590"/>
             <a:ext cx="418704" cy="369332"/>
           </a:xfrm>
           <a:prstGeom prst="rect">
@@ -7350,7 +7355,7 @@
         </p:nvSpPr>
         <p:spPr>
           <a:xfrm>
-            <a:off x="9890044" y="1214255"/>
+            <a:off x="8785203" y="2058027"/>
             <a:ext cx="418704" cy="369332"/>
           </a:xfrm>
           <a:prstGeom prst="rect">
@@ -7385,7 +7390,7 @@
         </p:nvSpPr>
         <p:spPr>
           <a:xfrm>
-            <a:off x="8799028" y="2022027"/>
+            <a:off x="10725436" y="2124209"/>
             <a:ext cx="418704" cy="369332"/>
           </a:xfrm>
           <a:prstGeom prst="rect">
@@ -7420,7 +7425,7 @@
         </p:nvSpPr>
         <p:spPr>
           <a:xfrm>
-            <a:off x="9825064" y="2420389"/>
+            <a:off x="8815437" y="3244334"/>
             <a:ext cx="418704" cy="369332"/>
           </a:xfrm>
           <a:prstGeom prst="rect">
@@ -7455,7 +7460,7 @@
         </p:nvSpPr>
         <p:spPr>
           <a:xfrm>
-            <a:off x="8774590" y="3257677"/>
+            <a:off x="10665563" y="3306831"/>
             <a:ext cx="418704" cy="369332"/>
           </a:xfrm>
           <a:prstGeom prst="rect">
@@ -7490,7 +7495,7 @@
         </p:nvSpPr>
         <p:spPr>
           <a:xfrm>
-            <a:off x="9799009" y="4359791"/>
+            <a:off x="5316502" y="1993429"/>
             <a:ext cx="418704" cy="369332"/>
           </a:xfrm>
           <a:prstGeom prst="rect">
@@ -7525,7 +7530,7 @@
         </p:nvSpPr>
         <p:spPr>
           <a:xfrm>
-            <a:off x="8124052" y="2004987"/>
+            <a:off x="7119933" y="2442804"/>
             <a:ext cx="418704" cy="369332"/>
           </a:xfrm>
           <a:prstGeom prst="rect">
@@ -7560,7 +7565,7 @@
         </p:nvSpPr>
         <p:spPr>
           <a:xfrm>
-            <a:off x="8173492" y="3293677"/>
+            <a:off x="7104714" y="4278671"/>
             <a:ext cx="418704" cy="369332"/>
           </a:xfrm>
           <a:prstGeom prst="rect">
@@ -7595,7 +7600,7 @@
         </p:nvSpPr>
         <p:spPr>
           <a:xfrm>
-            <a:off x="10991575" y="2004987"/>
+            <a:off x="9783409" y="2452020"/>
             <a:ext cx="418704" cy="369332"/>
           </a:xfrm>
           <a:prstGeom prst="rect">
@@ -7630,7 +7635,7 @@
         </p:nvSpPr>
         <p:spPr>
           <a:xfrm>
-            <a:off x="10967137" y="3240637"/>
+            <a:off x="9807041" y="4238112"/>
             <a:ext cx="418704" cy="369332"/>
           </a:xfrm>
           <a:prstGeom prst="rect">
@@ -7653,10 +7658,10 @@
       </p:sp>
       <p:sp>
         <p:nvSpPr>
-          <p:cNvPr id="93" name="Tekstiruutu 92">
-            <a:extLst>
-              <a:ext uri="{FF2B5EF4-FFF2-40B4-BE49-F238E27FC236}">
-                <a16:creationId xmlns:a16="http://schemas.microsoft.com/office/drawing/2014/main" id="{B58A2DBB-AFF5-97B0-B825-8DE8F061D8F6}"/>
+          <p:cNvPr id="4" name="Tekstiruutu 3">
+            <a:extLst>
+              <a:ext uri="{FF2B5EF4-FFF2-40B4-BE49-F238E27FC236}">
+                <a16:creationId xmlns:a16="http://schemas.microsoft.com/office/drawing/2014/main" id="{559F3DBE-9A96-9808-209A-626B271EB9A3}"/>
               </a:ext>
             </a:extLst>
           </p:cNvPr>
@@ -7665,8 +7670,8 @@
         </p:nvSpPr>
         <p:spPr>
           <a:xfrm>
-            <a:off x="5318122" y="2023974"/>
-            <a:ext cx="418704" cy="369332"/>
+            <a:off x="1324356" y="1304281"/>
+            <a:ext cx="301686" cy="369332"/>
           </a:xfrm>
           <a:prstGeom prst="rect">
             <a:avLst/>
@@ -7680,16 +7685,17 @@
           <a:lstStyle/>
           <a:p>
             <a:r>
-              <a:rPr lang="en-US" dirty="0"/>
-              <a:t>29</a:t>
-            </a:r>
+              <a:rPr lang="en-FI" dirty="0"/>
+              <a:t>0</a:t>
+            </a:r>
+            <a:endParaRPr lang="en-US" dirty="0"/>
           </a:p>
         </p:txBody>
       </p:sp>
     </p:spTree>
     <p:extLst>
       <p:ext uri="{BB962C8B-B14F-4D97-AF65-F5344CB8AC3E}">
-        <p14:creationId xmlns:p14="http://schemas.microsoft.com/office/powerpoint/2010/main" val="607921154"/>
+        <p14:creationId xmlns:p14="http://schemas.microsoft.com/office/powerpoint/2010/main" val="37440496"/>
       </p:ext>
     </p:extLst>
   </p:cSld>

</xml_diff>